<commit_message>
Doing Clean Code Chap 3
</commit_message>
<xml_diff>
--- a/cleanCode1.pptx
+++ b/cleanCode1.pptx
@@ -9,7 +9,9 @@
     <p:sldId id="257" r:id="rId3"/>
     <p:sldId id="259" r:id="rId4"/>
     <p:sldId id="260" r:id="rId5"/>
-    <p:sldId id="258" r:id="rId6"/>
+    <p:sldId id="261" r:id="rId6"/>
+    <p:sldId id="262" r:id="rId7"/>
+    <p:sldId id="263" r:id="rId8"/>
   </p:sldIdLst>
   <p:sldSz cx="12192000" cy="6858000"/>
   <p:notesSz cx="6858000" cy="9144000"/>
@@ -108,6 +110,11 @@
       </a:defRPr>
     </a:lvl9pPr>
   </p:defaultTextStyle>
+  <p:extLst>
+    <p:ext uri="{EFAFB233-063F-42B5-8137-9DF3F51BA10A}">
+      <p15:sldGuideLst xmlns:p15="http://schemas.microsoft.com/office/powerpoint/2012/main"/>
+    </p:ext>
+  </p:extLst>
 </p:presentation>
 </file>
 
@@ -3597,7 +3604,15 @@
           <a:bodyPr/>
           <a:lstStyle/>
           <a:p>
-            <a:endParaRPr lang="ko-KR" altLang="en-US"/>
+            <a:r>
+              <a:rPr lang="en-US" altLang="ko-KR" dirty="0" smtClean="0"/>
+              <a:t>Chapter </a:t>
+            </a:r>
+            <a:r>
+              <a:rPr lang="en-US" altLang="ko-KR" dirty="0" smtClean="0"/>
+              <a:t>3: Functions</a:t>
+            </a:r>
+            <a:endParaRPr lang="ko-KR" altLang="en-US" dirty="0"/>
           </a:p>
         </p:txBody>
       </p:sp>
@@ -3613,17 +3628,335 @@
         </p:nvSpPr>
         <p:spPr/>
         <p:txBody>
-          <a:bodyPr/>
-          <a:lstStyle/>
-          <a:p>
-            <a:endParaRPr lang="ko-KR" altLang="en-US"/>
+          <a:bodyPr>
+            <a:normAutofit/>
+          </a:bodyPr>
+          <a:lstStyle/>
+          <a:p>
+            <a:r>
+              <a:rPr lang="en-US" altLang="ko-KR" sz="2400" dirty="0" smtClean="0"/>
+              <a:t>Write </a:t>
+            </a:r>
+            <a:r>
+              <a:rPr lang="en-US" altLang="ko-KR" sz="2400" dirty="0" smtClean="0">
+                <a:solidFill>
+                  <a:srgbClr val="FF0000"/>
+                </a:solidFill>
+              </a:rPr>
+              <a:t>Small</a:t>
+            </a:r>
+            <a:r>
+              <a:rPr lang="en-US" altLang="ko-KR" sz="2400" dirty="0" smtClean="0"/>
+              <a:t> Functions</a:t>
+            </a:r>
+          </a:p>
+          <a:p>
+            <a:pPr lvl="1"/>
+            <a:r>
+              <a:rPr lang="en-US" altLang="ko-KR" sz="2000" dirty="0" smtClean="0"/>
+              <a:t>Much easier to understand</a:t>
+            </a:r>
+            <a:endParaRPr lang="en-US" altLang="ko-KR" sz="2000" dirty="0" smtClean="0"/>
+          </a:p>
+          <a:p>
+            <a:pPr lvl="1"/>
+            <a:r>
+              <a:rPr lang="en-US" altLang="ko-KR" sz="2000" dirty="0" smtClean="0"/>
+              <a:t>The indent level of a function should not be greater than one or two</a:t>
+            </a:r>
+            <a:endParaRPr lang="en-US" altLang="ko-KR" sz="2000" dirty="0"/>
+          </a:p>
+          <a:p>
+            <a:pPr marL="457200" lvl="1" indent="0">
+              <a:buNone/>
+            </a:pPr>
+            <a:endParaRPr lang="en-US" altLang="ko-KR" sz="2000" dirty="0" smtClean="0"/>
+          </a:p>
+          <a:p>
+            <a:r>
+              <a:rPr lang="en-US" altLang="ko-KR" sz="2400" dirty="0" smtClean="0"/>
+              <a:t>Functions Should Do One Thing</a:t>
+            </a:r>
+            <a:endParaRPr lang="en-US" altLang="ko-KR" sz="2000" dirty="0"/>
+          </a:p>
+          <a:p>
+            <a:r>
+              <a:rPr lang="en-US" altLang="ko-KR" sz="2400" dirty="0" smtClean="0"/>
+              <a:t>One Level of Abstraction per Function</a:t>
+            </a:r>
+          </a:p>
+          <a:p>
+            <a:endParaRPr lang="en-US" altLang="ko-KR" sz="2400" dirty="0"/>
+          </a:p>
+          <a:p>
+            <a:r>
+              <a:rPr lang="en-US" altLang="ko-KR" sz="2400" dirty="0" smtClean="0"/>
+              <a:t>Switch Statement</a:t>
+            </a:r>
+          </a:p>
+          <a:p>
+            <a:pPr lvl="1"/>
+            <a:r>
+              <a:rPr lang="en-US" altLang="ko-KR" sz="2000" dirty="0" smtClean="0"/>
+              <a:t>Make sure that switch statement is never repeated (with polymorphism)</a:t>
+            </a:r>
+          </a:p>
+          <a:p>
+            <a:pPr lvl="1"/>
+            <a:r>
+              <a:rPr lang="en-US" altLang="ko-KR" sz="2000" dirty="0" smtClean="0"/>
+              <a:t>Bury the switch statement </a:t>
+            </a:r>
+            <a:r>
+              <a:rPr lang="en-US" altLang="ko-KR" sz="2000" dirty="0" smtClean="0"/>
+              <a:t>in the basement of an Abstract Factory</a:t>
+            </a:r>
+          </a:p>
+          <a:p>
+            <a:pPr lvl="1"/>
+            <a:endParaRPr lang="en-US" altLang="ko-KR" sz="2000" dirty="0" smtClean="0"/>
           </a:p>
         </p:txBody>
       </p:sp>
     </p:spTree>
     <p:extLst>
       <p:ext uri="{BB962C8B-B14F-4D97-AF65-F5344CB8AC3E}">
-        <p14:creationId xmlns:p14="http://schemas.microsoft.com/office/powerpoint/2010/main" val="3500111194"/>
+        <p14:creationId xmlns:p14="http://schemas.microsoft.com/office/powerpoint/2010/main" val="1655691226"/>
+      </p:ext>
+    </p:extLst>
+  </p:cSld>
+  <p:clrMapOvr>
+    <a:masterClrMapping/>
+  </p:clrMapOvr>
+</p:sld>
+</file>
+
+<file path=ppt/slides/slide6.xml><?xml version="1.0" encoding="utf-8"?>
+<p:sld xmlns:a="http://schemas.openxmlformats.org/drawingml/2006/main" xmlns:r="http://schemas.openxmlformats.org/officeDocument/2006/relationships" xmlns:p="http://schemas.openxmlformats.org/presentationml/2006/main">
+  <p:cSld>
+    <p:spTree>
+      <p:nvGrpSpPr>
+        <p:cNvPr id="1" name=""/>
+        <p:cNvGrpSpPr/>
+        <p:nvPr/>
+      </p:nvGrpSpPr>
+      <p:grpSpPr>
+        <a:xfrm>
+          <a:off x="0" y="0"/>
+          <a:ext cx="0" cy="0"/>
+          <a:chOff x="0" y="0"/>
+          <a:chExt cx="0" cy="0"/>
+        </a:xfrm>
+      </p:grpSpPr>
+      <p:sp>
+        <p:nvSpPr>
+          <p:cNvPr id="2" name="제목 1"/>
+          <p:cNvSpPr>
+            <a:spLocks noGrp="1"/>
+          </p:cNvSpPr>
+          <p:nvPr>
+            <p:ph type="title"/>
+          </p:nvPr>
+        </p:nvSpPr>
+        <p:spPr/>
+        <p:txBody>
+          <a:bodyPr/>
+          <a:lstStyle/>
+          <a:p>
+            <a:r>
+              <a:rPr lang="en-US" altLang="ko-KR" dirty="0" smtClean="0"/>
+              <a:t>Chapter </a:t>
+            </a:r>
+            <a:r>
+              <a:rPr lang="en-US" altLang="ko-KR" dirty="0" smtClean="0"/>
+              <a:t>3: Functions</a:t>
+            </a:r>
+            <a:endParaRPr lang="ko-KR" altLang="en-US" dirty="0"/>
+          </a:p>
+        </p:txBody>
+      </p:sp>
+      <p:sp>
+        <p:nvSpPr>
+          <p:cNvPr id="3" name="내용 개체 틀 2"/>
+          <p:cNvSpPr>
+            <a:spLocks noGrp="1"/>
+          </p:cNvSpPr>
+          <p:nvPr>
+            <p:ph idx="1"/>
+          </p:nvPr>
+        </p:nvSpPr>
+        <p:spPr/>
+        <p:txBody>
+          <a:bodyPr>
+            <a:normAutofit/>
+          </a:bodyPr>
+          <a:lstStyle/>
+          <a:p>
+            <a:r>
+              <a:rPr lang="en-US" altLang="ko-KR" sz="2400" dirty="0" smtClean="0"/>
+              <a:t>Use Descriptive Names</a:t>
+            </a:r>
+          </a:p>
+          <a:p>
+            <a:pPr lvl="1"/>
+            <a:r>
+              <a:rPr lang="en-US" altLang="ko-KR" sz="2000" dirty="0" smtClean="0"/>
+              <a:t>A long descriptive name is better than a short enigmatic name</a:t>
+            </a:r>
+            <a:endParaRPr lang="en-US" altLang="ko-KR" sz="2000" dirty="0" smtClean="0"/>
+          </a:p>
+          <a:p>
+            <a:pPr lvl="1"/>
+            <a:r>
+              <a:rPr lang="en-US" altLang="ko-KR" sz="2000" dirty="0" smtClean="0"/>
+              <a:t>Try several different names and read the code with each in place</a:t>
+            </a:r>
+            <a:endParaRPr lang="en-US" altLang="ko-KR" sz="2000" dirty="0"/>
+          </a:p>
+          <a:p>
+            <a:pPr marL="457200" lvl="1" indent="0">
+              <a:buNone/>
+            </a:pPr>
+            <a:endParaRPr lang="en-US" altLang="ko-KR" sz="2000" dirty="0" smtClean="0"/>
+          </a:p>
+          <a:p>
+            <a:pPr lvl="2"/>
+            <a:endParaRPr lang="en-US" altLang="ko-KR" sz="1600" dirty="0"/>
+          </a:p>
+        </p:txBody>
+      </p:sp>
+    </p:spTree>
+    <p:extLst>
+      <p:ext uri="{BB962C8B-B14F-4D97-AF65-F5344CB8AC3E}">
+        <p14:creationId xmlns:p14="http://schemas.microsoft.com/office/powerpoint/2010/main" val="3510460923"/>
+      </p:ext>
+    </p:extLst>
+  </p:cSld>
+  <p:clrMapOvr>
+    <a:masterClrMapping/>
+  </p:clrMapOvr>
+</p:sld>
+</file>
+
+<file path=ppt/slides/slide7.xml><?xml version="1.0" encoding="utf-8"?>
+<p:sld xmlns:a="http://schemas.openxmlformats.org/drawingml/2006/main" xmlns:r="http://schemas.openxmlformats.org/officeDocument/2006/relationships" xmlns:p="http://schemas.openxmlformats.org/presentationml/2006/main">
+  <p:cSld>
+    <p:spTree>
+      <p:nvGrpSpPr>
+        <p:cNvPr id="1" name=""/>
+        <p:cNvGrpSpPr/>
+        <p:nvPr/>
+      </p:nvGrpSpPr>
+      <p:grpSpPr>
+        <a:xfrm>
+          <a:off x="0" y="0"/>
+          <a:ext cx="0" cy="0"/>
+          <a:chOff x="0" y="0"/>
+          <a:chExt cx="0" cy="0"/>
+        </a:xfrm>
+      </p:grpSpPr>
+      <p:sp>
+        <p:nvSpPr>
+          <p:cNvPr id="2" name="제목 1"/>
+          <p:cNvSpPr>
+            <a:spLocks noGrp="1"/>
+          </p:cNvSpPr>
+          <p:nvPr>
+            <p:ph type="title"/>
+          </p:nvPr>
+        </p:nvSpPr>
+        <p:spPr/>
+        <p:txBody>
+          <a:bodyPr/>
+          <a:lstStyle/>
+          <a:p>
+            <a:r>
+              <a:rPr lang="en-US" altLang="ko-KR" dirty="0" smtClean="0"/>
+              <a:t>Chapter </a:t>
+            </a:r>
+            <a:r>
+              <a:rPr lang="en-US" altLang="ko-KR" dirty="0" smtClean="0"/>
+              <a:t>3: Functions</a:t>
+            </a:r>
+            <a:endParaRPr lang="ko-KR" altLang="en-US" dirty="0"/>
+          </a:p>
+        </p:txBody>
+      </p:sp>
+      <p:sp>
+        <p:nvSpPr>
+          <p:cNvPr id="3" name="내용 개체 틀 2"/>
+          <p:cNvSpPr>
+            <a:spLocks noGrp="1"/>
+          </p:cNvSpPr>
+          <p:nvPr>
+            <p:ph idx="1"/>
+          </p:nvPr>
+        </p:nvSpPr>
+        <p:spPr/>
+        <p:txBody>
+          <a:bodyPr>
+            <a:normAutofit/>
+          </a:bodyPr>
+          <a:lstStyle/>
+          <a:p>
+            <a:r>
+              <a:rPr lang="en-US" altLang="ko-KR" sz="2400" dirty="0"/>
+              <a:t>Functions Arguments</a:t>
+            </a:r>
+          </a:p>
+          <a:p>
+            <a:pPr lvl="1"/>
+            <a:r>
+              <a:rPr lang="en-US" altLang="ko-KR" sz="2000" dirty="0"/>
+              <a:t>Readers have to interpret the arguments each time they saw it.</a:t>
+            </a:r>
+          </a:p>
+          <a:p>
+            <a:pPr lvl="1"/>
+            <a:r>
+              <a:rPr lang="en-US" altLang="ko-KR" sz="2000" dirty="0"/>
+              <a:t>Arguments are even harder from a testing point of </a:t>
+            </a:r>
+            <a:r>
+              <a:rPr lang="en-US" altLang="ko-KR" sz="2000" dirty="0" smtClean="0"/>
+              <a:t>view</a:t>
+            </a:r>
+          </a:p>
+          <a:p>
+            <a:pPr lvl="1"/>
+            <a:endParaRPr lang="en-US" altLang="ko-KR" sz="2000" dirty="0" smtClean="0"/>
+          </a:p>
+          <a:p>
+            <a:r>
+              <a:rPr lang="en-US" altLang="ko-KR" sz="2400" dirty="0" smtClean="0"/>
+              <a:t>Monadic</a:t>
+            </a:r>
+            <a:endParaRPr lang="en-US" altLang="ko-KR" sz="2400" dirty="0"/>
+          </a:p>
+          <a:p>
+            <a:pPr lvl="1"/>
+            <a:r>
+              <a:rPr lang="en-US" altLang="ko-KR" sz="2000" dirty="0"/>
+              <a:t>Asking a question</a:t>
+            </a:r>
+          </a:p>
+          <a:p>
+            <a:pPr lvl="1"/>
+            <a:r>
+              <a:rPr lang="en-US" altLang="ko-KR" sz="2000" dirty="0"/>
+              <a:t>transforming and return (don’t use argument for output)</a:t>
+            </a:r>
+          </a:p>
+          <a:p>
+            <a:pPr lvl="1"/>
+            <a:endParaRPr lang="en-US" altLang="ko-KR" sz="2000" dirty="0" smtClean="0"/>
+          </a:p>
+        </p:txBody>
+      </p:sp>
+    </p:spTree>
+    <p:extLst>
+      <p:ext uri="{BB962C8B-B14F-4D97-AF65-F5344CB8AC3E}">
+        <p14:creationId xmlns:p14="http://schemas.microsoft.com/office/powerpoint/2010/main" val="4028014399"/>
       </p:ext>
     </p:extLst>
   </p:cSld>

</xml_diff>

<commit_message>
cleanCode done until Chap 7
</commit_message>
<xml_diff>
--- a/cleanCode1.pptx
+++ b/cleanCode1.pptx
@@ -14,6 +14,9 @@
     <p:sldId id="263" r:id="rId8"/>
     <p:sldId id="264" r:id="rId9"/>
     <p:sldId id="265" r:id="rId10"/>
+    <p:sldId id="267" r:id="rId11"/>
+    <p:sldId id="266" r:id="rId12"/>
+    <p:sldId id="268" r:id="rId13"/>
   </p:sldIdLst>
   <p:sldSz cx="12192000" cy="6858000"/>
   <p:notesSz cx="6858000" cy="9144000"/>
@@ -251,7 +254,7 @@
           <a:p>
             <a:fld id="{43DD11A1-327F-4E26-A4E9-3CB588BA9255}" type="datetimeFigureOut">
               <a:rPr lang="ko-KR" altLang="en-US" smtClean="0"/>
-              <a:t>2016-09-20</a:t>
+              <a:t>2016-09-27</a:t>
             </a:fld>
             <a:endParaRPr lang="ko-KR" altLang="en-US"/>
           </a:p>
@@ -421,7 +424,7 @@
           <a:p>
             <a:fld id="{43DD11A1-327F-4E26-A4E9-3CB588BA9255}" type="datetimeFigureOut">
               <a:rPr lang="ko-KR" altLang="en-US" smtClean="0"/>
-              <a:t>2016-09-20</a:t>
+              <a:t>2016-09-27</a:t>
             </a:fld>
             <a:endParaRPr lang="ko-KR" altLang="en-US"/>
           </a:p>
@@ -601,7 +604,7 @@
           <a:p>
             <a:fld id="{43DD11A1-327F-4E26-A4E9-3CB588BA9255}" type="datetimeFigureOut">
               <a:rPr lang="ko-KR" altLang="en-US" smtClean="0"/>
-              <a:t>2016-09-20</a:t>
+              <a:t>2016-09-27</a:t>
             </a:fld>
             <a:endParaRPr lang="ko-KR" altLang="en-US"/>
           </a:p>
@@ -771,7 +774,7 @@
           <a:p>
             <a:fld id="{43DD11A1-327F-4E26-A4E9-3CB588BA9255}" type="datetimeFigureOut">
               <a:rPr lang="ko-KR" altLang="en-US" smtClean="0"/>
-              <a:t>2016-09-20</a:t>
+              <a:t>2016-09-27</a:t>
             </a:fld>
             <a:endParaRPr lang="ko-KR" altLang="en-US"/>
           </a:p>
@@ -1017,7 +1020,7 @@
           <a:p>
             <a:fld id="{43DD11A1-327F-4E26-A4E9-3CB588BA9255}" type="datetimeFigureOut">
               <a:rPr lang="ko-KR" altLang="en-US" smtClean="0"/>
-              <a:t>2016-09-20</a:t>
+              <a:t>2016-09-27</a:t>
             </a:fld>
             <a:endParaRPr lang="ko-KR" altLang="en-US"/>
           </a:p>
@@ -1249,7 +1252,7 @@
           <a:p>
             <a:fld id="{43DD11A1-327F-4E26-A4E9-3CB588BA9255}" type="datetimeFigureOut">
               <a:rPr lang="ko-KR" altLang="en-US" smtClean="0"/>
-              <a:t>2016-09-20</a:t>
+              <a:t>2016-09-27</a:t>
             </a:fld>
             <a:endParaRPr lang="ko-KR" altLang="en-US"/>
           </a:p>
@@ -1616,7 +1619,7 @@
           <a:p>
             <a:fld id="{43DD11A1-327F-4E26-A4E9-3CB588BA9255}" type="datetimeFigureOut">
               <a:rPr lang="ko-KR" altLang="en-US" smtClean="0"/>
-              <a:t>2016-09-20</a:t>
+              <a:t>2016-09-27</a:t>
             </a:fld>
             <a:endParaRPr lang="ko-KR" altLang="en-US"/>
           </a:p>
@@ -1734,7 +1737,7 @@
           <a:p>
             <a:fld id="{43DD11A1-327F-4E26-A4E9-3CB588BA9255}" type="datetimeFigureOut">
               <a:rPr lang="ko-KR" altLang="en-US" smtClean="0"/>
-              <a:t>2016-09-20</a:t>
+              <a:t>2016-09-27</a:t>
             </a:fld>
             <a:endParaRPr lang="ko-KR" altLang="en-US"/>
           </a:p>
@@ -1829,7 +1832,7 @@
           <a:p>
             <a:fld id="{43DD11A1-327F-4E26-A4E9-3CB588BA9255}" type="datetimeFigureOut">
               <a:rPr lang="ko-KR" altLang="en-US" smtClean="0"/>
-              <a:t>2016-09-20</a:t>
+              <a:t>2016-09-27</a:t>
             </a:fld>
             <a:endParaRPr lang="ko-KR" altLang="en-US"/>
           </a:p>
@@ -2106,7 +2109,7 @@
           <a:p>
             <a:fld id="{43DD11A1-327F-4E26-A4E9-3CB588BA9255}" type="datetimeFigureOut">
               <a:rPr lang="ko-KR" altLang="en-US" smtClean="0"/>
-              <a:t>2016-09-20</a:t>
+              <a:t>2016-09-27</a:t>
             </a:fld>
             <a:endParaRPr lang="ko-KR" altLang="en-US"/>
           </a:p>
@@ -2359,7 +2362,7 @@
           <a:p>
             <a:fld id="{43DD11A1-327F-4E26-A4E9-3CB588BA9255}" type="datetimeFigureOut">
               <a:rPr lang="ko-KR" altLang="en-US" smtClean="0"/>
-              <a:t>2016-09-20</a:t>
+              <a:t>2016-09-27</a:t>
             </a:fld>
             <a:endParaRPr lang="ko-KR" altLang="en-US"/>
           </a:p>
@@ -2572,7 +2575,7 @@
           <a:p>
             <a:fld id="{43DD11A1-327F-4E26-A4E9-3CB588BA9255}" type="datetimeFigureOut">
               <a:rPr lang="ko-KR" altLang="en-US" smtClean="0"/>
-              <a:t>2016-09-20</a:t>
+              <a:t>2016-09-27</a:t>
             </a:fld>
             <a:endParaRPr lang="ko-KR" altLang="en-US"/>
           </a:p>
@@ -3046,6 +3049,371 @@
 </p:sld>
 </file>
 
+<file path=ppt/slides/slide10.xml><?xml version="1.0" encoding="utf-8"?>
+<p:sld xmlns:a="http://schemas.openxmlformats.org/drawingml/2006/main" xmlns:r="http://schemas.openxmlformats.org/officeDocument/2006/relationships" xmlns:p="http://schemas.openxmlformats.org/presentationml/2006/main">
+  <p:cSld>
+    <p:spTree>
+      <p:nvGrpSpPr>
+        <p:cNvPr id="1" name=""/>
+        <p:cNvGrpSpPr/>
+        <p:nvPr/>
+      </p:nvGrpSpPr>
+      <p:grpSpPr>
+        <a:xfrm>
+          <a:off x="0" y="0"/>
+          <a:ext cx="0" cy="0"/>
+          <a:chOff x="0" y="0"/>
+          <a:chExt cx="0" cy="0"/>
+        </a:xfrm>
+      </p:grpSpPr>
+      <p:sp>
+        <p:nvSpPr>
+          <p:cNvPr id="2" name="제목 1"/>
+          <p:cNvSpPr>
+            <a:spLocks noGrp="1"/>
+          </p:cNvSpPr>
+          <p:nvPr>
+            <p:ph type="title"/>
+          </p:nvPr>
+        </p:nvSpPr>
+        <p:spPr/>
+        <p:txBody>
+          <a:bodyPr/>
+          <a:lstStyle/>
+          <a:p>
+            <a:r>
+              <a:rPr lang="en-US" altLang="ko-KR" dirty="0" smtClean="0"/>
+              <a:t>Chapter 7: Error Handling</a:t>
+            </a:r>
+            <a:endParaRPr lang="ko-KR" altLang="en-US" dirty="0"/>
+          </a:p>
+        </p:txBody>
+      </p:sp>
+      <p:sp>
+        <p:nvSpPr>
+          <p:cNvPr id="3" name="내용 개체 틀 2"/>
+          <p:cNvSpPr>
+            <a:spLocks noGrp="1"/>
+          </p:cNvSpPr>
+          <p:nvPr>
+            <p:ph idx="1"/>
+          </p:nvPr>
+        </p:nvSpPr>
+        <p:spPr>
+          <a:xfrm>
+            <a:off x="838200" y="1825625"/>
+            <a:ext cx="10515600" cy="4748170"/>
+          </a:xfrm>
+        </p:spPr>
+        <p:txBody>
+          <a:bodyPr>
+            <a:normAutofit/>
+          </a:bodyPr>
+          <a:lstStyle/>
+          <a:p>
+            <a:r>
+              <a:rPr lang="en-US" altLang="ko-KR" dirty="0" smtClean="0"/>
+              <a:t>Error handling is important, but it shouldn’t obscure logic</a:t>
+            </a:r>
+          </a:p>
+          <a:p>
+            <a:r>
+              <a:rPr lang="en-US" altLang="ko-KR" dirty="0" smtClean="0"/>
+              <a:t>Use Exceptions Rather Than Return Code</a:t>
+            </a:r>
+          </a:p>
+          <a:p>
+            <a:pPr lvl="1"/>
+            <a:r>
+              <a:rPr lang="en-US" altLang="ko-KR" dirty="0"/>
+              <a:t>E</a:t>
+            </a:r>
+            <a:r>
+              <a:rPr lang="en-US" altLang="ko-KR" dirty="0" smtClean="0"/>
+              <a:t>asy to forget to check return value of function</a:t>
+            </a:r>
+          </a:p>
+          <a:p>
+            <a:pPr lvl="1"/>
+            <a:r>
+              <a:rPr lang="en-US" altLang="ko-KR" dirty="0" smtClean="0"/>
+              <a:t>Error handling is separated</a:t>
+            </a:r>
+          </a:p>
+          <a:p>
+            <a:endParaRPr lang="en-US" altLang="ko-KR" dirty="0"/>
+          </a:p>
+          <a:p>
+            <a:r>
+              <a:rPr lang="en-US" altLang="ko-KR" dirty="0" smtClean="0"/>
+              <a:t>Write Your Try-Catch-Finally Statement First</a:t>
+            </a:r>
+          </a:p>
+          <a:p>
+            <a:pPr lvl="1"/>
+            <a:r>
+              <a:rPr lang="en-US" altLang="ko-KR" dirty="0" smtClean="0"/>
+              <a:t>It helps you define what the user of that code should expect</a:t>
+            </a:r>
+          </a:p>
+          <a:p>
+            <a:pPr lvl="1"/>
+            <a:endParaRPr lang="en-US" altLang="ko-KR" dirty="0"/>
+          </a:p>
+          <a:p>
+            <a:r>
+              <a:rPr lang="en-US" altLang="ko-KR" dirty="0" smtClean="0"/>
+              <a:t>Use Unchecked Exceptions</a:t>
+            </a:r>
+          </a:p>
+          <a:p>
+            <a:pPr lvl="1"/>
+            <a:r>
+              <a:rPr lang="en-US" altLang="ko-KR" dirty="0"/>
+              <a:t>C</a:t>
+            </a:r>
+            <a:r>
+              <a:rPr lang="en-US" altLang="ko-KR" dirty="0" smtClean="0"/>
+              <a:t>hange on low level force changes on many higher levels (Checked)</a:t>
+            </a:r>
+            <a:endParaRPr lang="ko-KR" altLang="en-US" dirty="0"/>
+          </a:p>
+        </p:txBody>
+      </p:sp>
+    </p:spTree>
+    <p:extLst>
+      <p:ext uri="{BB962C8B-B14F-4D97-AF65-F5344CB8AC3E}">
+        <p14:creationId xmlns:p14="http://schemas.microsoft.com/office/powerpoint/2010/main" val="1346553360"/>
+      </p:ext>
+    </p:extLst>
+  </p:cSld>
+  <p:clrMapOvr>
+    <a:masterClrMapping/>
+  </p:clrMapOvr>
+</p:sld>
+</file>
+
+<file path=ppt/slides/slide11.xml><?xml version="1.0" encoding="utf-8"?>
+<p:sld xmlns:a="http://schemas.openxmlformats.org/drawingml/2006/main" xmlns:r="http://schemas.openxmlformats.org/officeDocument/2006/relationships" xmlns:p="http://schemas.openxmlformats.org/presentationml/2006/main">
+  <p:cSld>
+    <p:spTree>
+      <p:nvGrpSpPr>
+        <p:cNvPr id="1" name=""/>
+        <p:cNvGrpSpPr/>
+        <p:nvPr/>
+      </p:nvGrpSpPr>
+      <p:grpSpPr>
+        <a:xfrm>
+          <a:off x="0" y="0"/>
+          <a:ext cx="0" cy="0"/>
+          <a:chOff x="0" y="0"/>
+          <a:chExt cx="0" cy="0"/>
+        </a:xfrm>
+      </p:grpSpPr>
+      <p:sp>
+        <p:nvSpPr>
+          <p:cNvPr id="2" name="제목 1"/>
+          <p:cNvSpPr>
+            <a:spLocks noGrp="1"/>
+          </p:cNvSpPr>
+          <p:nvPr>
+            <p:ph type="title"/>
+          </p:nvPr>
+        </p:nvSpPr>
+        <p:spPr/>
+        <p:txBody>
+          <a:bodyPr/>
+          <a:lstStyle/>
+          <a:p>
+            <a:r>
+              <a:rPr lang="en-US" altLang="ko-KR" dirty="0" smtClean="0"/>
+              <a:t>Chapter 7: Error Handling</a:t>
+            </a:r>
+            <a:endParaRPr lang="ko-KR" altLang="en-US" dirty="0"/>
+          </a:p>
+        </p:txBody>
+      </p:sp>
+      <p:sp>
+        <p:nvSpPr>
+          <p:cNvPr id="3" name="내용 개체 틀 2"/>
+          <p:cNvSpPr>
+            <a:spLocks noGrp="1"/>
+          </p:cNvSpPr>
+          <p:nvPr>
+            <p:ph idx="1"/>
+          </p:nvPr>
+        </p:nvSpPr>
+        <p:spPr>
+          <a:xfrm>
+            <a:off x="838200" y="1825625"/>
+            <a:ext cx="10515600" cy="4748170"/>
+          </a:xfrm>
+        </p:spPr>
+        <p:txBody>
+          <a:bodyPr>
+            <a:normAutofit/>
+          </a:bodyPr>
+          <a:lstStyle/>
+          <a:p>
+            <a:r>
+              <a:rPr lang="en-US" altLang="ko-KR" dirty="0" smtClean="0"/>
+              <a:t>Provide Context with Exceptions</a:t>
+            </a:r>
+          </a:p>
+          <a:p>
+            <a:r>
+              <a:rPr lang="en-US" altLang="ko-KR" dirty="0" smtClean="0"/>
+              <a:t>Define Exception Classes in Terms of a Caller’s Needs</a:t>
+            </a:r>
+          </a:p>
+          <a:p>
+            <a:pPr lvl="1"/>
+            <a:r>
+              <a:rPr lang="en-US" altLang="ko-KR" dirty="0" smtClean="0"/>
+              <a:t>Simplify the code by wrapping the API</a:t>
+            </a:r>
+          </a:p>
+          <a:p>
+            <a:pPr lvl="1"/>
+            <a:endParaRPr lang="en-US" altLang="ko-KR" dirty="0"/>
+          </a:p>
+          <a:p>
+            <a:r>
+              <a:rPr lang="en-US" altLang="ko-KR" dirty="0" smtClean="0"/>
+              <a:t>Define the Normal Flow</a:t>
+            </a:r>
+          </a:p>
+          <a:p>
+            <a:pPr lvl="1"/>
+            <a:r>
+              <a:rPr lang="en-US" altLang="ko-KR" dirty="0" smtClean="0"/>
+              <a:t>Use the ‘Special Case Pattern’</a:t>
+            </a:r>
+          </a:p>
+          <a:p>
+            <a:pPr lvl="1"/>
+            <a:r>
+              <a:rPr lang="en-US" altLang="ko-KR" dirty="0" smtClean="0"/>
+              <a:t>Create a class handling special case (behavior is encapsulated)</a:t>
+            </a:r>
+          </a:p>
+          <a:p>
+            <a:pPr lvl="1"/>
+            <a:endParaRPr lang="en-US" altLang="ko-KR" dirty="0"/>
+          </a:p>
+          <a:p>
+            <a:r>
+              <a:rPr lang="en-US" altLang="ko-KR" dirty="0" smtClean="0"/>
+              <a:t>Don’t Return Null, Don’t Pass Null</a:t>
+            </a:r>
+          </a:p>
+          <a:p>
+            <a:pPr lvl="1"/>
+            <a:r>
+              <a:rPr lang="en-US" altLang="ko-KR" dirty="0" smtClean="0"/>
+              <a:t>Throw an exception or returning a Special Case object instead</a:t>
+            </a:r>
+          </a:p>
+        </p:txBody>
+      </p:sp>
+    </p:spTree>
+    <p:extLst>
+      <p:ext uri="{BB962C8B-B14F-4D97-AF65-F5344CB8AC3E}">
+        <p14:creationId xmlns:p14="http://schemas.microsoft.com/office/powerpoint/2010/main" val="2278199016"/>
+      </p:ext>
+    </p:extLst>
+  </p:cSld>
+  <p:clrMapOvr>
+    <a:masterClrMapping/>
+  </p:clrMapOvr>
+</p:sld>
+</file>
+
+<file path=ppt/slides/slide12.xml><?xml version="1.0" encoding="utf-8"?>
+<p:sld xmlns:a="http://schemas.openxmlformats.org/drawingml/2006/main" xmlns:r="http://schemas.openxmlformats.org/officeDocument/2006/relationships" xmlns:p="http://schemas.openxmlformats.org/presentationml/2006/main">
+  <p:cSld>
+    <p:spTree>
+      <p:nvGrpSpPr>
+        <p:cNvPr id="1" name=""/>
+        <p:cNvGrpSpPr/>
+        <p:nvPr/>
+      </p:nvGrpSpPr>
+      <p:grpSpPr>
+        <a:xfrm>
+          <a:off x="0" y="0"/>
+          <a:ext cx="0" cy="0"/>
+          <a:chOff x="0" y="0"/>
+          <a:chExt cx="0" cy="0"/>
+        </a:xfrm>
+      </p:grpSpPr>
+      <p:sp>
+        <p:nvSpPr>
+          <p:cNvPr id="2" name="제목 1"/>
+          <p:cNvSpPr>
+            <a:spLocks noGrp="1"/>
+          </p:cNvSpPr>
+          <p:nvPr>
+            <p:ph type="title"/>
+          </p:nvPr>
+        </p:nvSpPr>
+        <p:spPr/>
+        <p:txBody>
+          <a:bodyPr/>
+          <a:lstStyle/>
+          <a:p>
+            <a:r>
+              <a:rPr lang="en-US" altLang="ko-KR" dirty="0" smtClean="0"/>
+              <a:t>Chapter 9: Unit Tests</a:t>
+            </a:r>
+            <a:endParaRPr lang="ko-KR" altLang="en-US" dirty="0"/>
+          </a:p>
+        </p:txBody>
+      </p:sp>
+      <p:sp>
+        <p:nvSpPr>
+          <p:cNvPr id="3" name="내용 개체 틀 2"/>
+          <p:cNvSpPr>
+            <a:spLocks noGrp="1"/>
+          </p:cNvSpPr>
+          <p:nvPr>
+            <p:ph idx="1"/>
+          </p:nvPr>
+        </p:nvSpPr>
+        <p:spPr>
+          <a:xfrm>
+            <a:off x="838200" y="1825625"/>
+            <a:ext cx="10515600" cy="4748170"/>
+          </a:xfrm>
+        </p:spPr>
+        <p:txBody>
+          <a:bodyPr>
+            <a:normAutofit/>
+          </a:bodyPr>
+          <a:lstStyle/>
+          <a:p>
+            <a:r>
+              <a:rPr lang="en-US" altLang="ko-KR" dirty="0" smtClean="0"/>
+              <a:t>Don’t Pass Null</a:t>
+            </a:r>
+          </a:p>
+          <a:p>
+            <a:endParaRPr lang="en-US" altLang="ko-KR" dirty="0" smtClean="0"/>
+          </a:p>
+        </p:txBody>
+      </p:sp>
+    </p:spTree>
+    <p:extLst>
+      <p:ext uri="{BB962C8B-B14F-4D97-AF65-F5344CB8AC3E}">
+        <p14:creationId xmlns:p14="http://schemas.microsoft.com/office/powerpoint/2010/main" val="2895999354"/>
+      </p:ext>
+    </p:extLst>
+  </p:cSld>
+  <p:clrMapOvr>
+    <a:masterClrMapping/>
+  </p:clrMapOvr>
+</p:sld>
+</file>
+
 <file path=ppt/slides/slide2.xml><?xml version="1.0" encoding="utf-8"?>
 <p:sld xmlns:a="http://schemas.openxmlformats.org/drawingml/2006/main" xmlns:r="http://schemas.openxmlformats.org/officeDocument/2006/relationships" xmlns:p="http://schemas.openxmlformats.org/presentationml/2006/main">
   <p:cSld>
@@ -4233,15 +4601,7 @@
             <a:pPr lvl="1"/>
             <a:r>
               <a:rPr lang="en-US" altLang="ko-KR" sz="2000" dirty="0" smtClean="0"/>
-              <a:t>Mumbling, </a:t>
-            </a:r>
-            <a:r>
-              <a:rPr lang="en-US" altLang="ko-KR" sz="2000" dirty="0" smtClean="0"/>
-              <a:t>Redundant Comments, </a:t>
-            </a:r>
-            <a:r>
-              <a:rPr lang="en-US" altLang="ko-KR" sz="2000" dirty="0" smtClean="0"/>
-              <a:t>Misleading Comments</a:t>
+              <a:t>Mumbling, Redundant Comments, Misleading Comments</a:t>
             </a:r>
           </a:p>
           <a:p>
@@ -4272,7 +4632,6 @@
               <a:rPr lang="en-US" altLang="ko-KR" sz="2000" dirty="0" smtClean="0"/>
               <a:t>Noise Comments (with no new information)</a:t>
             </a:r>
-            <a:endParaRPr lang="en-US" altLang="ko-KR" sz="2000" dirty="0" smtClean="0"/>
           </a:p>
           <a:p>
             <a:pPr lvl="1"/>

</xml_diff>

<commit_message>
Clean Code Chapter 7, 9, 10 Done
</commit_message>
<xml_diff>
--- a/cleanCode1.pptx
+++ b/cleanCode1.pptx
@@ -17,6 +17,10 @@
     <p:sldId id="267" r:id="rId11"/>
     <p:sldId id="266" r:id="rId12"/>
     <p:sldId id="268" r:id="rId13"/>
+    <p:sldId id="269" r:id="rId14"/>
+    <p:sldId id="270" r:id="rId15"/>
+    <p:sldId id="272" r:id="rId16"/>
+    <p:sldId id="273" r:id="rId17"/>
   </p:sldIdLst>
   <p:sldSz cx="12192000" cy="6858000"/>
   <p:notesSz cx="6858000" cy="9144000"/>
@@ -2999,7 +3003,11 @@
           <a:p>
             <a:r>
               <a:rPr lang="en-US" altLang="ko-KR" sz="4400" dirty="0" smtClean="0"/>
-              <a:t>Clean Code (Chapter 2-4)</a:t>
+              <a:t>Clean </a:t>
+            </a:r>
+            <a:r>
+              <a:rPr lang="en-US" altLang="ko-KR" sz="4400" dirty="0" smtClean="0"/>
+              <a:t>Code</a:t>
             </a:r>
             <a:endParaRPr lang="ko-KR" altLang="en-US" sz="4400" dirty="0"/>
           </a:p>
@@ -3112,71 +3120,78 @@
           <a:lstStyle/>
           <a:p>
             <a:r>
-              <a:rPr lang="en-US" altLang="ko-KR" dirty="0" smtClean="0"/>
+              <a:rPr lang="en-US" altLang="ko-KR" sz="2400" dirty="0" smtClean="0"/>
               <a:t>Error handling is important, but it shouldn’t obscure logic</a:t>
             </a:r>
           </a:p>
           <a:p>
-            <a:r>
-              <a:rPr lang="en-US" altLang="ko-KR" dirty="0" smtClean="0"/>
-              <a:t>Use Exceptions Rather Than Return Code</a:t>
-            </a:r>
-          </a:p>
-          <a:p>
-            <a:pPr lvl="1"/>
-            <a:r>
-              <a:rPr lang="en-US" altLang="ko-KR" dirty="0"/>
+            <a:endParaRPr lang="en-US" altLang="ko-KR" sz="2400" dirty="0" smtClean="0"/>
+          </a:p>
+          <a:p>
+            <a:r>
+              <a:rPr lang="en-US" altLang="ko-KR" sz="2400" dirty="0" smtClean="0"/>
+              <a:t>Use </a:t>
+            </a:r>
+            <a:r>
+              <a:rPr lang="en-US" altLang="ko-KR" sz="2400" dirty="0" smtClean="0"/>
+              <a:t>Exceptions Rather Than Return Code</a:t>
+            </a:r>
+          </a:p>
+          <a:p>
+            <a:pPr lvl="1"/>
+            <a:r>
+              <a:rPr lang="en-US" altLang="ko-KR" sz="2000" dirty="0"/>
               <a:t>E</a:t>
             </a:r>
             <a:r>
-              <a:rPr lang="en-US" altLang="ko-KR" dirty="0" smtClean="0"/>
+              <a:rPr lang="en-US" altLang="ko-KR" sz="2000" dirty="0" smtClean="0"/>
               <a:t>asy to forget to check return value of function</a:t>
             </a:r>
           </a:p>
           <a:p>
             <a:pPr lvl="1"/>
             <a:r>
-              <a:rPr lang="en-US" altLang="ko-KR" dirty="0" smtClean="0"/>
+              <a:rPr lang="en-US" altLang="ko-KR" sz="2000" dirty="0" smtClean="0"/>
               <a:t>Error handling is separated</a:t>
             </a:r>
           </a:p>
           <a:p>
+            <a:endParaRPr lang="en-US" altLang="ko-KR" sz="2400" dirty="0"/>
+          </a:p>
+          <a:p>
+            <a:r>
+              <a:rPr lang="en-US" altLang="ko-KR" sz="2400" dirty="0" smtClean="0"/>
+              <a:t>Write Your Try-Catch-Finally Statement First</a:t>
+            </a:r>
+          </a:p>
+          <a:p>
+            <a:pPr lvl="1"/>
+            <a:r>
+              <a:rPr lang="en-US" altLang="ko-KR" sz="2000" dirty="0" smtClean="0"/>
+              <a:t>It helps you define what the user of that code should expect</a:t>
+            </a:r>
+          </a:p>
+          <a:p>
+            <a:pPr lvl="1"/>
             <a:endParaRPr lang="en-US" altLang="ko-KR" dirty="0"/>
           </a:p>
           <a:p>
             <a:r>
-              <a:rPr lang="en-US" altLang="ko-KR" dirty="0" smtClean="0"/>
-              <a:t>Write Your Try-Catch-Finally Statement First</a:t>
-            </a:r>
-          </a:p>
-          <a:p>
-            <a:pPr lvl="1"/>
-            <a:r>
-              <a:rPr lang="en-US" altLang="ko-KR" dirty="0" smtClean="0"/>
-              <a:t>It helps you define what the user of that code should expect</a:t>
-            </a:r>
-          </a:p>
-          <a:p>
-            <a:pPr lvl="1"/>
-            <a:endParaRPr lang="en-US" altLang="ko-KR" dirty="0"/>
-          </a:p>
-          <a:p>
-            <a:r>
-              <a:rPr lang="en-US" altLang="ko-KR" dirty="0" smtClean="0"/>
+              <a:rPr lang="en-US" altLang="ko-KR" sz="2400" dirty="0" smtClean="0"/>
               <a:t>Use Unchecked Exceptions</a:t>
             </a:r>
           </a:p>
           <a:p>
             <a:pPr lvl="1"/>
             <a:r>
-              <a:rPr lang="en-US" altLang="ko-KR" dirty="0"/>
+              <a:rPr lang="en-US" altLang="ko-KR" sz="2000" dirty="0"/>
               <a:t>C</a:t>
             </a:r>
             <a:r>
-              <a:rPr lang="en-US" altLang="ko-KR" dirty="0" smtClean="0"/>
+              <a:rPr lang="en-US" altLang="ko-KR" sz="2000" dirty="0" smtClean="0"/>
               <a:t>hange on low level force changes on many higher levels (Checked)</a:t>
             </a:r>
-            <a:endParaRPr lang="ko-KR" altLang="en-US" dirty="0"/>
+            <a:endParaRPr lang="ko-KR" altLang="en-US" sz="2000" dirty="0"/>
           </a:p>
         </p:txBody>
       </p:sp>
@@ -3256,20 +3271,27 @@
           <a:lstStyle/>
           <a:p>
             <a:r>
-              <a:rPr lang="en-US" altLang="ko-KR" dirty="0" smtClean="0"/>
+              <a:rPr lang="en-US" altLang="ko-KR" sz="2400" dirty="0" smtClean="0"/>
               <a:t>Provide Context with Exceptions</a:t>
             </a:r>
           </a:p>
           <a:p>
-            <a:r>
-              <a:rPr lang="en-US" altLang="ko-KR" dirty="0" smtClean="0"/>
-              <a:t>Define Exception Classes in Terms of a Caller’s Needs</a:t>
-            </a:r>
-          </a:p>
-          <a:p>
-            <a:pPr lvl="1"/>
-            <a:r>
-              <a:rPr lang="en-US" altLang="ko-KR" dirty="0" smtClean="0"/>
+            <a:endParaRPr lang="en-US" altLang="ko-KR" sz="2400" dirty="0" smtClean="0"/>
+          </a:p>
+          <a:p>
+            <a:r>
+              <a:rPr lang="en-US" altLang="ko-KR" sz="2400" dirty="0" smtClean="0"/>
+              <a:t>Define </a:t>
+            </a:r>
+            <a:r>
+              <a:rPr lang="en-US" altLang="ko-KR" sz="2400" dirty="0" smtClean="0"/>
+              <a:t>Exception Classes in Terms of a Caller’s Needs</a:t>
+            </a:r>
+          </a:p>
+          <a:p>
+            <a:pPr lvl="1"/>
+            <a:r>
+              <a:rPr lang="en-US" altLang="ko-KR" sz="2000" dirty="0" smtClean="0"/>
               <a:t>Simplify the code by wrapping the API</a:t>
             </a:r>
           </a:p>
@@ -3279,21 +3301,21 @@
           </a:p>
           <a:p>
             <a:r>
-              <a:rPr lang="en-US" altLang="ko-KR" dirty="0" smtClean="0"/>
+              <a:rPr lang="en-US" altLang="ko-KR" sz="2400" dirty="0" smtClean="0"/>
               <a:t>Define the Normal Flow</a:t>
             </a:r>
           </a:p>
           <a:p>
             <a:pPr lvl="1"/>
             <a:r>
-              <a:rPr lang="en-US" altLang="ko-KR" dirty="0" smtClean="0"/>
+              <a:rPr lang="en-US" altLang="ko-KR" sz="2000" dirty="0" smtClean="0"/>
               <a:t>Use the ‘Special Case Pattern’</a:t>
             </a:r>
           </a:p>
           <a:p>
             <a:pPr lvl="1"/>
             <a:r>
-              <a:rPr lang="en-US" altLang="ko-KR" dirty="0" smtClean="0"/>
+              <a:rPr lang="en-US" altLang="ko-KR" sz="2000" dirty="0" smtClean="0"/>
               <a:t>Create a class handling special case (behavior is encapsulated)</a:t>
             </a:r>
           </a:p>
@@ -3303,14 +3325,14 @@
           </a:p>
           <a:p>
             <a:r>
-              <a:rPr lang="en-US" altLang="ko-KR" dirty="0" smtClean="0"/>
+              <a:rPr lang="en-US" altLang="ko-KR" sz="2400" dirty="0" smtClean="0"/>
               <a:t>Don’t Return Null, Don’t Pass Null</a:t>
             </a:r>
           </a:p>
           <a:p>
             <a:pPr lvl="1"/>
             <a:r>
-              <a:rPr lang="en-US" altLang="ko-KR" dirty="0" smtClean="0"/>
+              <a:rPr lang="en-US" altLang="ko-KR" sz="2000" dirty="0" smtClean="0"/>
               <a:t>Throw an exception or returning a Special Case object instead</a:t>
             </a:r>
           </a:p>
@@ -3392,12 +3414,64 @@
           <a:lstStyle/>
           <a:p>
             <a:r>
+              <a:rPr lang="en-US" altLang="ko-KR" sz="2400" dirty="0" smtClean="0"/>
+              <a:t>The Three Laws of TDD</a:t>
+            </a:r>
+          </a:p>
+          <a:p>
+            <a:pPr lvl="1"/>
+            <a:r>
+              <a:rPr lang="en-US" altLang="ko-KR" sz="2000" dirty="0" smtClean="0"/>
+              <a:t>First Law: You may not write production code until you have written a failing unit test</a:t>
+            </a:r>
+            <a:endParaRPr lang="en-US" altLang="ko-KR" sz="2000" dirty="0" smtClean="0"/>
+          </a:p>
+          <a:p>
+            <a:pPr lvl="1"/>
+            <a:r>
+              <a:rPr lang="en-US" altLang="ko-KR" sz="2000" dirty="0" smtClean="0"/>
+              <a:t>Second Law: Yo</a:t>
+            </a:r>
+            <a:r>
+              <a:rPr lang="en-US" altLang="ko-KR" sz="2000" dirty="0" smtClean="0"/>
+              <a:t>u may not write more of a unit test than is sufficient to fail, and not compiling is failing</a:t>
+            </a:r>
+          </a:p>
+          <a:p>
+            <a:pPr lvl="1"/>
+            <a:r>
+              <a:rPr lang="en-US" altLang="ko-KR" sz="2000" dirty="0" smtClean="0"/>
+              <a:t>Third Law: You may not write more production code than is sufficient to pass the </a:t>
+            </a:r>
+            <a:r>
               <a:rPr lang="en-US" altLang="ko-KR" dirty="0" smtClean="0"/>
-              <a:t>Don’t Pass Null</a:t>
-            </a:r>
-          </a:p>
-          <a:p>
-            <a:endParaRPr lang="en-US" altLang="ko-KR" dirty="0" smtClean="0"/>
+              <a:t>currently failing test</a:t>
+            </a:r>
+          </a:p>
+          <a:p>
+            <a:pPr lvl="1"/>
+            <a:endParaRPr lang="en-US" altLang="ko-KR" dirty="0"/>
+          </a:p>
+          <a:p>
+            <a:r>
+              <a:rPr lang="en-US" altLang="ko-KR" sz="2400" dirty="0" smtClean="0"/>
+              <a:t>Keeping Tests Clean</a:t>
+            </a:r>
+          </a:p>
+          <a:p>
+            <a:pPr lvl="1"/>
+            <a:r>
+              <a:rPr lang="en-US" altLang="ko-KR" sz="2000" dirty="0" smtClean="0"/>
+              <a:t>Having dirty tests is equivalent to, if not worse than, having no tests</a:t>
+            </a:r>
+          </a:p>
+          <a:p>
+            <a:pPr lvl="1"/>
+            <a:r>
+              <a:rPr lang="en-US" altLang="ko-KR" sz="2000" dirty="0" smtClean="0"/>
+              <a:t>Test code is just as important as production code</a:t>
+            </a:r>
+            <a:endParaRPr lang="en-US" altLang="ko-KR" sz="2000" dirty="0" smtClean="0"/>
           </a:p>
         </p:txBody>
       </p:sp>
@@ -3405,6 +3479,653 @@
     <p:extLst>
       <p:ext uri="{BB962C8B-B14F-4D97-AF65-F5344CB8AC3E}">
         <p14:creationId xmlns:p14="http://schemas.microsoft.com/office/powerpoint/2010/main" val="2895999354"/>
+      </p:ext>
+    </p:extLst>
+  </p:cSld>
+  <p:clrMapOvr>
+    <a:masterClrMapping/>
+  </p:clrMapOvr>
+</p:sld>
+</file>
+
+<file path=ppt/slides/slide13.xml><?xml version="1.0" encoding="utf-8"?>
+<p:sld xmlns:a="http://schemas.openxmlformats.org/drawingml/2006/main" xmlns:r="http://schemas.openxmlformats.org/officeDocument/2006/relationships" xmlns:p="http://schemas.openxmlformats.org/presentationml/2006/main">
+  <p:cSld>
+    <p:spTree>
+      <p:nvGrpSpPr>
+        <p:cNvPr id="1" name=""/>
+        <p:cNvGrpSpPr/>
+        <p:nvPr/>
+      </p:nvGrpSpPr>
+      <p:grpSpPr>
+        <a:xfrm>
+          <a:off x="0" y="0"/>
+          <a:ext cx="0" cy="0"/>
+          <a:chOff x="0" y="0"/>
+          <a:chExt cx="0" cy="0"/>
+        </a:xfrm>
+      </p:grpSpPr>
+      <p:sp>
+        <p:nvSpPr>
+          <p:cNvPr id="2" name="제목 1"/>
+          <p:cNvSpPr>
+            <a:spLocks noGrp="1"/>
+          </p:cNvSpPr>
+          <p:nvPr>
+            <p:ph type="title"/>
+          </p:nvPr>
+        </p:nvSpPr>
+        <p:spPr/>
+        <p:txBody>
+          <a:bodyPr/>
+          <a:lstStyle/>
+          <a:p>
+            <a:r>
+              <a:rPr lang="en-US" altLang="ko-KR" dirty="0" smtClean="0"/>
+              <a:t>Chapter 9: Unit Tests</a:t>
+            </a:r>
+            <a:endParaRPr lang="ko-KR" altLang="en-US" dirty="0"/>
+          </a:p>
+        </p:txBody>
+      </p:sp>
+      <p:sp>
+        <p:nvSpPr>
+          <p:cNvPr id="3" name="내용 개체 틀 2"/>
+          <p:cNvSpPr>
+            <a:spLocks noGrp="1"/>
+          </p:cNvSpPr>
+          <p:nvPr>
+            <p:ph idx="1"/>
+          </p:nvPr>
+        </p:nvSpPr>
+        <p:spPr>
+          <a:xfrm>
+            <a:off x="838200" y="1825624"/>
+            <a:ext cx="10515600" cy="5032375"/>
+          </a:xfrm>
+        </p:spPr>
+        <p:txBody>
+          <a:bodyPr>
+            <a:normAutofit/>
+          </a:bodyPr>
+          <a:lstStyle/>
+          <a:p>
+            <a:r>
+              <a:rPr lang="en-US" altLang="ko-KR" sz="2400" dirty="0" smtClean="0"/>
+              <a:t>Clean Tests</a:t>
+            </a:r>
+          </a:p>
+          <a:p>
+            <a:pPr lvl="1"/>
+            <a:r>
+              <a:rPr lang="en-US" altLang="ko-KR" sz="2000" dirty="0" smtClean="0"/>
+              <a:t>Clarity, simplicity, and density of expression</a:t>
+            </a:r>
+          </a:p>
+          <a:p>
+            <a:pPr lvl="1"/>
+            <a:r>
+              <a:rPr lang="en-US" altLang="ko-KR" sz="2000" dirty="0" smtClean="0"/>
+              <a:t>The Build-Operate-</a:t>
+            </a:r>
+            <a:r>
+              <a:rPr lang="en-US" altLang="ko-KR" sz="2000" dirty="0" err="1" smtClean="0"/>
+              <a:t>Chack</a:t>
+            </a:r>
+            <a:r>
+              <a:rPr lang="en-US" altLang="ko-KR" sz="2000" dirty="0" smtClean="0"/>
+              <a:t> pattern builds the structure</a:t>
+            </a:r>
+          </a:p>
+          <a:p>
+            <a:pPr lvl="1"/>
+            <a:endParaRPr lang="en-US" altLang="ko-KR" dirty="0"/>
+          </a:p>
+          <a:p>
+            <a:r>
+              <a:rPr lang="en-US" altLang="ko-KR" sz="2400" dirty="0" smtClean="0"/>
+              <a:t>Keeping Tests Clean</a:t>
+            </a:r>
+          </a:p>
+          <a:p>
+            <a:pPr lvl="1"/>
+            <a:r>
+              <a:rPr lang="en-US" altLang="ko-KR" sz="2000" dirty="0" smtClean="0"/>
+              <a:t>Having dirty tests is equivalent to, if not worse than, having no tests</a:t>
+            </a:r>
+          </a:p>
+          <a:p>
+            <a:pPr lvl="1"/>
+            <a:r>
+              <a:rPr lang="en-US" altLang="ko-KR" sz="2000" dirty="0" smtClean="0"/>
+              <a:t>Test code is just as important as production code</a:t>
+            </a:r>
+          </a:p>
+          <a:p>
+            <a:pPr lvl="1"/>
+            <a:endParaRPr lang="en-US" altLang="ko-KR" dirty="0"/>
+          </a:p>
+          <a:p>
+            <a:r>
+              <a:rPr lang="en-US" altLang="ko-KR" sz="2400" dirty="0" smtClean="0"/>
+              <a:t>Use Domain Specific Testing Language</a:t>
+            </a:r>
+            <a:endParaRPr lang="en-US" altLang="ko-KR" sz="2400" dirty="0" smtClean="0"/>
+          </a:p>
+          <a:p>
+            <a:endParaRPr lang="en-US" altLang="ko-KR" sz="2400" dirty="0" smtClean="0"/>
+          </a:p>
+          <a:p>
+            <a:r>
+              <a:rPr lang="en-US" altLang="ko-KR" sz="2400" dirty="0" smtClean="0"/>
+              <a:t>A Dual Standard</a:t>
+            </a:r>
+          </a:p>
+          <a:p>
+            <a:pPr lvl="1"/>
+            <a:r>
+              <a:rPr lang="en-US" altLang="ko-KR" sz="2000" dirty="0" smtClean="0"/>
+              <a:t>Testing code need not be as efficient as production code</a:t>
+            </a:r>
+            <a:endParaRPr lang="en-US" altLang="ko-KR" sz="2000" dirty="0" smtClean="0"/>
+          </a:p>
+        </p:txBody>
+      </p:sp>
+    </p:spTree>
+    <p:extLst>
+      <p:ext uri="{BB962C8B-B14F-4D97-AF65-F5344CB8AC3E}">
+        <p14:creationId xmlns:p14="http://schemas.microsoft.com/office/powerpoint/2010/main" val="1972153298"/>
+      </p:ext>
+    </p:extLst>
+  </p:cSld>
+  <p:clrMapOvr>
+    <a:masterClrMapping/>
+  </p:clrMapOvr>
+</p:sld>
+</file>
+
+<file path=ppt/slides/slide14.xml><?xml version="1.0" encoding="utf-8"?>
+<p:sld xmlns:a="http://schemas.openxmlformats.org/drawingml/2006/main" xmlns:r="http://schemas.openxmlformats.org/officeDocument/2006/relationships" xmlns:p="http://schemas.openxmlformats.org/presentationml/2006/main">
+  <p:cSld>
+    <p:spTree>
+      <p:nvGrpSpPr>
+        <p:cNvPr id="1" name=""/>
+        <p:cNvGrpSpPr/>
+        <p:nvPr/>
+      </p:nvGrpSpPr>
+      <p:grpSpPr>
+        <a:xfrm>
+          <a:off x="0" y="0"/>
+          <a:ext cx="0" cy="0"/>
+          <a:chOff x="0" y="0"/>
+          <a:chExt cx="0" cy="0"/>
+        </a:xfrm>
+      </p:grpSpPr>
+      <p:sp>
+        <p:nvSpPr>
+          <p:cNvPr id="2" name="제목 1"/>
+          <p:cNvSpPr>
+            <a:spLocks noGrp="1"/>
+          </p:cNvSpPr>
+          <p:nvPr>
+            <p:ph type="title"/>
+          </p:nvPr>
+        </p:nvSpPr>
+        <p:spPr/>
+        <p:txBody>
+          <a:bodyPr/>
+          <a:lstStyle/>
+          <a:p>
+            <a:r>
+              <a:rPr lang="en-US" altLang="ko-KR" dirty="0" smtClean="0"/>
+              <a:t>Chapter 9: Unit Tests</a:t>
+            </a:r>
+            <a:endParaRPr lang="ko-KR" altLang="en-US" dirty="0"/>
+          </a:p>
+        </p:txBody>
+      </p:sp>
+      <p:sp>
+        <p:nvSpPr>
+          <p:cNvPr id="3" name="내용 개체 틀 2"/>
+          <p:cNvSpPr>
+            <a:spLocks noGrp="1"/>
+          </p:cNvSpPr>
+          <p:nvPr>
+            <p:ph idx="1"/>
+          </p:nvPr>
+        </p:nvSpPr>
+        <p:spPr>
+          <a:xfrm>
+            <a:off x="838200" y="1825624"/>
+            <a:ext cx="10515600" cy="5032375"/>
+          </a:xfrm>
+        </p:spPr>
+        <p:txBody>
+          <a:bodyPr>
+            <a:normAutofit/>
+          </a:bodyPr>
+          <a:lstStyle/>
+          <a:p>
+            <a:r>
+              <a:rPr lang="en-US" altLang="ko-KR" sz="2400" dirty="0" smtClean="0"/>
+              <a:t>One Assert per Test, Single Concept per Test</a:t>
+            </a:r>
+          </a:p>
+          <a:p>
+            <a:pPr lvl="1"/>
+            <a:r>
+              <a:rPr lang="en-US" altLang="ko-KR" sz="2000" dirty="0" smtClean="0"/>
+              <a:t>Given-when-then convention for function names</a:t>
+            </a:r>
+          </a:p>
+          <a:p>
+            <a:pPr lvl="1"/>
+            <a:endParaRPr lang="en-US" altLang="ko-KR" dirty="0"/>
+          </a:p>
+          <a:p>
+            <a:r>
+              <a:rPr lang="en-US" altLang="ko-KR" sz="2400" dirty="0" smtClean="0"/>
+              <a:t>F.I.R.S.T.</a:t>
+            </a:r>
+          </a:p>
+          <a:p>
+            <a:pPr lvl="1"/>
+            <a:r>
+              <a:rPr lang="en-US" altLang="ko-KR" sz="2000" dirty="0" smtClean="0"/>
+              <a:t>Fast: When tests run slow, you won’t want to run then frequently</a:t>
+            </a:r>
+          </a:p>
+          <a:p>
+            <a:pPr lvl="1"/>
+            <a:r>
+              <a:rPr lang="en-US" altLang="ko-KR" sz="2000" dirty="0" smtClean="0"/>
+              <a:t>Independent: Dependency make diagnosis difficult</a:t>
+            </a:r>
+          </a:p>
+          <a:p>
+            <a:pPr lvl="1"/>
+            <a:r>
+              <a:rPr lang="en-US" altLang="ko-KR" sz="2000" dirty="0" smtClean="0"/>
+              <a:t>Repeatable: Test should be repeatable in any environment</a:t>
+            </a:r>
+          </a:p>
+          <a:p>
+            <a:pPr lvl="1"/>
+            <a:r>
+              <a:rPr lang="en-US" altLang="ko-KR" sz="2000" dirty="0" smtClean="0"/>
+              <a:t>Self-Validating: The tests should have a </a:t>
+            </a:r>
+            <a:r>
+              <a:rPr lang="en-US" altLang="ko-KR" sz="2000" dirty="0" err="1" smtClean="0"/>
+              <a:t>boolean</a:t>
+            </a:r>
+            <a:r>
+              <a:rPr lang="en-US" altLang="ko-KR" sz="2000" dirty="0" smtClean="0"/>
+              <a:t> output</a:t>
+            </a:r>
+          </a:p>
+          <a:p>
+            <a:pPr lvl="1"/>
+            <a:r>
+              <a:rPr lang="en-US" altLang="ko-KR" sz="2000" dirty="0" smtClean="0"/>
+              <a:t>Timely: The test need to be written in a timely fashion. Unit tests should be written </a:t>
+            </a:r>
+            <a:r>
+              <a:rPr lang="en-US" altLang="ko-KR" sz="2000" dirty="0" smtClean="0">
+                <a:solidFill>
+                  <a:srgbClr val="FF0000"/>
+                </a:solidFill>
+              </a:rPr>
+              <a:t>just before</a:t>
+            </a:r>
+            <a:r>
+              <a:rPr lang="en-US" altLang="ko-KR" sz="2000" dirty="0" smtClean="0"/>
+              <a:t> the production code.</a:t>
+            </a:r>
+          </a:p>
+          <a:p>
+            <a:pPr lvl="1"/>
+            <a:endParaRPr lang="en-US" altLang="ko-KR" dirty="0" smtClean="0"/>
+          </a:p>
+        </p:txBody>
+      </p:sp>
+    </p:spTree>
+    <p:extLst>
+      <p:ext uri="{BB962C8B-B14F-4D97-AF65-F5344CB8AC3E}">
+        <p14:creationId xmlns:p14="http://schemas.microsoft.com/office/powerpoint/2010/main" val="1918891200"/>
+      </p:ext>
+    </p:extLst>
+  </p:cSld>
+  <p:clrMapOvr>
+    <a:masterClrMapping/>
+  </p:clrMapOvr>
+</p:sld>
+</file>
+
+<file path=ppt/slides/slide15.xml><?xml version="1.0" encoding="utf-8"?>
+<p:sld xmlns:a="http://schemas.openxmlformats.org/drawingml/2006/main" xmlns:r="http://schemas.openxmlformats.org/officeDocument/2006/relationships" xmlns:p="http://schemas.openxmlformats.org/presentationml/2006/main">
+  <p:cSld>
+    <p:spTree>
+      <p:nvGrpSpPr>
+        <p:cNvPr id="1" name=""/>
+        <p:cNvGrpSpPr/>
+        <p:nvPr/>
+      </p:nvGrpSpPr>
+      <p:grpSpPr>
+        <a:xfrm>
+          <a:off x="0" y="0"/>
+          <a:ext cx="0" cy="0"/>
+          <a:chOff x="0" y="0"/>
+          <a:chExt cx="0" cy="0"/>
+        </a:xfrm>
+      </p:grpSpPr>
+      <p:sp>
+        <p:nvSpPr>
+          <p:cNvPr id="2" name="제목 1"/>
+          <p:cNvSpPr>
+            <a:spLocks noGrp="1"/>
+          </p:cNvSpPr>
+          <p:nvPr>
+            <p:ph type="title"/>
+          </p:nvPr>
+        </p:nvSpPr>
+        <p:spPr/>
+        <p:txBody>
+          <a:bodyPr/>
+          <a:lstStyle/>
+          <a:p>
+            <a:r>
+              <a:rPr lang="en-US" altLang="ko-KR" dirty="0" smtClean="0"/>
+              <a:t>Chapter </a:t>
+            </a:r>
+            <a:r>
+              <a:rPr lang="en-US" altLang="ko-KR" dirty="0" smtClean="0"/>
+              <a:t>10</a:t>
+            </a:r>
+            <a:r>
+              <a:rPr lang="en-US" altLang="ko-KR" dirty="0" smtClean="0"/>
+              <a:t>: Classes</a:t>
+            </a:r>
+            <a:endParaRPr lang="ko-KR" altLang="en-US" dirty="0"/>
+          </a:p>
+        </p:txBody>
+      </p:sp>
+      <p:sp>
+        <p:nvSpPr>
+          <p:cNvPr id="3" name="내용 개체 틀 2"/>
+          <p:cNvSpPr>
+            <a:spLocks noGrp="1"/>
+          </p:cNvSpPr>
+          <p:nvPr>
+            <p:ph idx="1"/>
+          </p:nvPr>
+        </p:nvSpPr>
+        <p:spPr>
+          <a:xfrm>
+            <a:off x="838199" y="1825624"/>
+            <a:ext cx="11098427" cy="5032375"/>
+          </a:xfrm>
+        </p:spPr>
+        <p:txBody>
+          <a:bodyPr>
+            <a:normAutofit/>
+          </a:bodyPr>
+          <a:lstStyle/>
+          <a:p>
+            <a:r>
+              <a:rPr lang="en-US" altLang="ko-KR" sz="2400" dirty="0" smtClean="0"/>
+              <a:t>Class Should Be Small</a:t>
+            </a:r>
+          </a:p>
+          <a:p>
+            <a:pPr lvl="1"/>
+            <a:r>
+              <a:rPr lang="en-US" altLang="ko-KR" sz="2000" dirty="0" smtClean="0"/>
+              <a:t>Smaller is the primary rule when it comes to designing classes</a:t>
+            </a:r>
+          </a:p>
+          <a:p>
+            <a:pPr lvl="1"/>
+            <a:r>
+              <a:rPr lang="en-US" altLang="ko-KR" sz="2000" dirty="0" smtClean="0"/>
+              <a:t>The name of a class should describe what responsibilities it fulfills</a:t>
+            </a:r>
+          </a:p>
+          <a:p>
+            <a:pPr lvl="1"/>
+            <a:r>
+              <a:rPr lang="en-US" altLang="ko-KR" sz="2000" dirty="0" smtClean="0"/>
+              <a:t>Derive a </a:t>
+            </a:r>
+            <a:r>
+              <a:rPr lang="en-US" altLang="ko-KR" sz="2000" dirty="0" smtClean="0">
+                <a:solidFill>
+                  <a:srgbClr val="FF0000"/>
+                </a:solidFill>
+              </a:rPr>
+              <a:t>concise name</a:t>
+            </a:r>
+            <a:r>
+              <a:rPr lang="en-US" altLang="ko-KR" sz="2000" dirty="0" smtClean="0"/>
+              <a:t> for a class</a:t>
+            </a:r>
+          </a:p>
+          <a:p>
+            <a:pPr lvl="1"/>
+            <a:endParaRPr lang="en-US" altLang="ko-KR" dirty="0" smtClean="0"/>
+          </a:p>
+          <a:p>
+            <a:r>
+              <a:rPr lang="en-US" altLang="ko-KR" sz="2400" dirty="0" smtClean="0"/>
+              <a:t>The Single Responsibility Principle (SRP)</a:t>
+            </a:r>
+          </a:p>
+          <a:p>
+            <a:pPr lvl="1"/>
+            <a:r>
+              <a:rPr lang="en-US" altLang="ko-KR" sz="2000" dirty="0" smtClean="0"/>
+              <a:t>Classes should have one responsibility – one reason to change</a:t>
+            </a:r>
+          </a:p>
+          <a:p>
+            <a:pPr lvl="1"/>
+            <a:r>
+              <a:rPr lang="en-US" altLang="ko-KR" sz="2000" dirty="0"/>
+              <a:t>M</a:t>
+            </a:r>
+            <a:r>
+              <a:rPr lang="en-US" altLang="ko-KR" sz="2000" dirty="0" smtClean="0"/>
+              <a:t>any small drawers each well-labeled &gt; few drawers that toss everything</a:t>
+            </a:r>
+          </a:p>
+          <a:p>
+            <a:pPr lvl="1"/>
+            <a:r>
+              <a:rPr lang="en-US" altLang="ko-KR" sz="2000" dirty="0" smtClean="0"/>
+              <a:t>Organize it so that a developer knows where to look to find things</a:t>
+            </a:r>
+          </a:p>
+          <a:p>
+            <a:pPr lvl="1"/>
+            <a:endParaRPr lang="en-US" altLang="ko-KR" sz="2000" dirty="0" smtClean="0"/>
+          </a:p>
+          <a:p>
+            <a:r>
+              <a:rPr lang="en-US" altLang="ko-KR" sz="2400" dirty="0" smtClean="0"/>
+              <a:t>Cohesion</a:t>
+            </a:r>
+          </a:p>
+          <a:p>
+            <a:pPr lvl="1"/>
+            <a:r>
+              <a:rPr lang="en-US" altLang="ko-KR" sz="2000" dirty="0" smtClean="0"/>
+              <a:t>The m</a:t>
+            </a:r>
+            <a:r>
+              <a:rPr lang="en-US" altLang="ko-KR" sz="2000" dirty="0" smtClean="0"/>
+              <a:t>ore variables a method manipulates the more cohesive that method is to its class</a:t>
+            </a:r>
+          </a:p>
+          <a:p>
+            <a:pPr lvl="1"/>
+            <a:r>
+              <a:rPr lang="en-US" altLang="ko-KR" sz="2000" dirty="0" smtClean="0"/>
+              <a:t>Cohesion to be high</a:t>
+            </a:r>
+            <a:endParaRPr lang="en-US" altLang="ko-KR" sz="2000" dirty="0" smtClean="0"/>
+          </a:p>
+          <a:p>
+            <a:pPr lvl="1"/>
+            <a:endParaRPr lang="en-US" altLang="ko-KR" sz="2000" dirty="0" smtClean="0"/>
+          </a:p>
+        </p:txBody>
+      </p:sp>
+    </p:spTree>
+    <p:extLst>
+      <p:ext uri="{BB962C8B-B14F-4D97-AF65-F5344CB8AC3E}">
+        <p14:creationId xmlns:p14="http://schemas.microsoft.com/office/powerpoint/2010/main" val="987209950"/>
+      </p:ext>
+    </p:extLst>
+  </p:cSld>
+  <p:clrMapOvr>
+    <a:masterClrMapping/>
+  </p:clrMapOvr>
+</p:sld>
+</file>
+
+<file path=ppt/slides/slide16.xml><?xml version="1.0" encoding="utf-8"?>
+<p:sld xmlns:a="http://schemas.openxmlformats.org/drawingml/2006/main" xmlns:r="http://schemas.openxmlformats.org/officeDocument/2006/relationships" xmlns:p="http://schemas.openxmlformats.org/presentationml/2006/main">
+  <p:cSld>
+    <p:spTree>
+      <p:nvGrpSpPr>
+        <p:cNvPr id="1" name=""/>
+        <p:cNvGrpSpPr/>
+        <p:nvPr/>
+      </p:nvGrpSpPr>
+      <p:grpSpPr>
+        <a:xfrm>
+          <a:off x="0" y="0"/>
+          <a:ext cx="0" cy="0"/>
+          <a:chOff x="0" y="0"/>
+          <a:chExt cx="0" cy="0"/>
+        </a:xfrm>
+      </p:grpSpPr>
+      <p:sp>
+        <p:nvSpPr>
+          <p:cNvPr id="2" name="제목 1"/>
+          <p:cNvSpPr>
+            <a:spLocks noGrp="1"/>
+          </p:cNvSpPr>
+          <p:nvPr>
+            <p:ph type="title"/>
+          </p:nvPr>
+        </p:nvSpPr>
+        <p:spPr/>
+        <p:txBody>
+          <a:bodyPr/>
+          <a:lstStyle/>
+          <a:p>
+            <a:r>
+              <a:rPr lang="en-US" altLang="ko-KR" dirty="0" smtClean="0"/>
+              <a:t>Chapter </a:t>
+            </a:r>
+            <a:r>
+              <a:rPr lang="en-US" altLang="ko-KR" dirty="0" smtClean="0"/>
+              <a:t>10</a:t>
+            </a:r>
+            <a:r>
+              <a:rPr lang="en-US" altLang="ko-KR" dirty="0" smtClean="0"/>
+              <a:t>: Classes</a:t>
+            </a:r>
+            <a:endParaRPr lang="ko-KR" altLang="en-US" dirty="0"/>
+          </a:p>
+        </p:txBody>
+      </p:sp>
+      <p:sp>
+        <p:nvSpPr>
+          <p:cNvPr id="3" name="내용 개체 틀 2"/>
+          <p:cNvSpPr>
+            <a:spLocks noGrp="1"/>
+          </p:cNvSpPr>
+          <p:nvPr>
+            <p:ph idx="1"/>
+          </p:nvPr>
+        </p:nvSpPr>
+        <p:spPr>
+          <a:xfrm>
+            <a:off x="838199" y="1825624"/>
+            <a:ext cx="10515601" cy="5032375"/>
+          </a:xfrm>
+        </p:spPr>
+        <p:txBody>
+          <a:bodyPr>
+            <a:normAutofit/>
+          </a:bodyPr>
+          <a:lstStyle/>
+          <a:p>
+            <a:r>
+              <a:rPr lang="en-US" altLang="ko-KR" sz="2400" dirty="0" smtClean="0"/>
+              <a:t>Maintaining Cohesion Results in Many Small Classes</a:t>
+            </a:r>
+          </a:p>
+          <a:p>
+            <a:pPr lvl="1"/>
+            <a:r>
+              <a:rPr lang="en-US" altLang="ko-KR" sz="2000" dirty="0" smtClean="0"/>
+              <a:t>When classes lose cohesion, split them</a:t>
+            </a:r>
+          </a:p>
+          <a:p>
+            <a:pPr lvl="1"/>
+            <a:endParaRPr lang="en-US" altLang="ko-KR" sz="2000" dirty="0"/>
+          </a:p>
+          <a:p>
+            <a:r>
+              <a:rPr lang="en-US" altLang="ko-KR" sz="2400" dirty="0" smtClean="0"/>
+              <a:t>Organizing for Change</a:t>
+            </a:r>
+          </a:p>
+          <a:p>
+            <a:pPr lvl="1"/>
+            <a:r>
+              <a:rPr lang="en-US" altLang="ko-KR" sz="2000" dirty="0" smtClean="0"/>
+              <a:t>Open-Closed Principle (OCP): Classes should be open for extension but closed for modification</a:t>
+            </a:r>
+          </a:p>
+          <a:p>
+            <a:pPr lvl="1"/>
+            <a:endParaRPr lang="en-US" altLang="ko-KR" sz="2000" dirty="0"/>
+          </a:p>
+          <a:p>
+            <a:r>
+              <a:rPr lang="en-US" altLang="ko-KR" sz="2400" dirty="0" smtClean="0"/>
+              <a:t>Isolating from Change</a:t>
+            </a:r>
+          </a:p>
+          <a:p>
+            <a:pPr lvl="1"/>
+            <a:r>
+              <a:rPr lang="en-US" altLang="ko-KR" sz="2000" dirty="0" smtClean="0"/>
+              <a:t>Dependencies upon concrete details create challenges for testing</a:t>
+            </a:r>
+          </a:p>
+          <a:p>
+            <a:pPr lvl="1"/>
+            <a:r>
+              <a:rPr lang="en-US" altLang="ko-KR" sz="2000" dirty="0" smtClean="0"/>
+              <a:t>Instead of designing so that it directly depends upon concrete class, create </a:t>
+            </a:r>
+            <a:r>
+              <a:rPr lang="en-US" altLang="ko-KR" sz="2000" smtClean="0"/>
+              <a:t>an interface.</a:t>
+            </a:r>
+          </a:p>
+        </p:txBody>
+      </p:sp>
+    </p:spTree>
+    <p:extLst>
+      <p:ext uri="{BB962C8B-B14F-4D97-AF65-F5344CB8AC3E}">
+        <p14:creationId xmlns:p14="http://schemas.microsoft.com/office/powerpoint/2010/main" val="4050304147"/>
       </p:ext>
     </p:extLst>
   </p:cSld>

</xml_diff>